<commit_message>
updating samples and slides
</commit_message>
<xml_diff>
--- a/Slides/Developing with the Media API May 2012.pptx
+++ b/Slides/Developing with the Media API May 2012.pptx
@@ -19669,16 +19669,7 @@
                 </a:solidFill>
                 <a:cs typeface="ＭＳ Ｐゴシック"/>
               </a:rPr>
-              <a:t>Methods </a:t>
-            </a:r>
-            <a:r>
-              <a:rPr lang="en-US" sz="1800" dirty="0" smtClean="0">
-                <a:solidFill>
-                  <a:srgbClr val="23383A"/>
-                </a:solidFill>
-                <a:cs typeface="ＭＳ Ｐゴシック"/>
-              </a:rPr>
-              <a:t>which perform queries on our servers, and return sets of data in DTOs (Data Transfer Objects)</a:t>
+              <a:t>Methods which perform queries on our servers, and return sets of data in DTOs (Data Transfer Objects)</a:t>
             </a:r>
           </a:p>
           <a:p>
@@ -19707,16 +19698,7 @@
                 </a:solidFill>
                 <a:cs typeface="ＭＳ Ｐゴシック"/>
               </a:rPr>
-              <a:t>ata </a:t>
-            </a:r>
-            <a:r>
-              <a:rPr lang="en-US" sz="1800" dirty="0" smtClean="0">
-                <a:solidFill>
-                  <a:srgbClr val="23383A"/>
-                </a:solidFill>
-                <a:cs typeface="ＭＳ Ｐゴシック"/>
-              </a:rPr>
-              <a:t>is cached for performance (up to 20 minutes)</a:t>
+              <a:t>ata is cached for performance (up to 20 minutes)</a:t>
             </a:r>
           </a:p>
           <a:p>
@@ -25241,15 +25223,7 @@
             </a:pPr>
             <a:r>
               <a:rPr lang="en-US" sz="1800" i="1" dirty="0" smtClean="0"/>
-              <a:t>We will use </a:t>
-            </a:r>
-            <a:r>
-              <a:rPr lang="en-US" sz="1800" i="1" dirty="0" smtClean="0"/>
-              <a:t>PHP </a:t>
-            </a:r>
-            <a:r>
-              <a:rPr lang="en-US" sz="1800" i="1" dirty="0" smtClean="0"/>
-              <a:t>here - see </a:t>
+              <a:t>We will use PHP here - see </a:t>
             </a:r>
             <a:r>
               <a:rPr lang="en-US" sz="1800" i="1" dirty="0" smtClean="0">
@@ -25754,30 +25728,12 @@
               </a:lnSpc>
             </a:pPr>
             <a:r>
+              <a:rPr lang="en-US" sz="1800" smtClean="0"/>
+              <a:t>Moderation </a:t>
+            </a:r>
+            <a:r>
               <a:rPr lang="en-US" sz="1800" dirty="0" smtClean="0"/>
-              <a:t>Campaign Management</a:t>
-            </a:r>
-          </a:p>
-          <a:p>
-            <a:pPr lvl="1" eaLnBrk="1" hangingPunct="1">
-              <a:lnSpc>
-                <a:spcPct val="90000"/>
-              </a:lnSpc>
-            </a:pPr>
-            <a:r>
-              <a:rPr lang="en-US" sz="1800" dirty="0" smtClean="0"/>
-              <a:t>Switching Status of series of Videos</a:t>
-            </a:r>
-          </a:p>
-          <a:p>
-            <a:pPr eaLnBrk="1" hangingPunct="1">
-              <a:lnSpc>
-                <a:spcPct val="90000"/>
-              </a:lnSpc>
-            </a:pPr>
-            <a:r>
-              <a:rPr lang="en-US" sz="1800" dirty="0" smtClean="0"/>
-              <a:t>Moderation (providing limited access to your media library)</a:t>
+              <a:t>(providing limited access to your media library)</a:t>
             </a:r>
           </a:p>
           <a:p>
@@ -26147,86 +26103,6 @@
                       </p:childTnLst>
                     </p:cTn>
                   </p:par>
-                  <p:par>
-                    <p:cTn id="27" fill="hold">
-                      <p:stCondLst>
-                        <p:cond delay="indefinite"/>
-                      </p:stCondLst>
-                      <p:childTnLst>
-                        <p:par>
-                          <p:cTn id="28" fill="hold">
-                            <p:stCondLst>
-                              <p:cond delay="0"/>
-                            </p:stCondLst>
-                            <p:childTnLst>
-                              <p:par>
-                                <p:cTn id="29" presetID="1" presetClass="entr" presetSubtype="0" fill="hold" nodeType="clickEffect">
-                                  <p:stCondLst>
-                                    <p:cond delay="0"/>
-                                  </p:stCondLst>
-                                  <p:childTnLst>
-                                    <p:set>
-                                      <p:cBhvr>
-                                        <p:cTn id="30" dur="1" fill="hold">
-                                          <p:stCondLst>
-                                            <p:cond delay="0"/>
-                                          </p:stCondLst>
-                                        </p:cTn>
-                                        <p:tgtEl>
-                                          <p:spTgt spid="267267">
-                                            <p:txEl>
-                                              <p:pRg st="9" end="9"/>
-                                            </p:txEl>
-                                          </p:spTgt>
-                                        </p:tgtEl>
-                                        <p:attrNameLst>
-                                          <p:attrName>style.visibility</p:attrName>
-                                        </p:attrNameLst>
-                                      </p:cBhvr>
-                                      <p:to>
-                                        <p:strVal val="visible"/>
-                                      </p:to>
-                                    </p:set>
-                                  </p:childTnLst>
-                                </p:cTn>
-                              </p:par>
-                              <p:par>
-                                <p:cTn id="31" presetID="1" presetClass="entr" presetSubtype="0" fill="hold" nodeType="withEffect">
-                                  <p:stCondLst>
-                                    <p:cond delay="0"/>
-                                  </p:stCondLst>
-                                  <p:childTnLst>
-                                    <p:set>
-                                      <p:cBhvr>
-                                        <p:cTn id="32" dur="1" fill="hold">
-                                          <p:stCondLst>
-                                            <p:cond delay="0"/>
-                                          </p:stCondLst>
-                                        </p:cTn>
-                                        <p:tgtEl>
-                                          <p:spTgt spid="267267">
-                                            <p:txEl>
-                                              <p:pRg st="10" end="10"/>
-                                            </p:txEl>
-                                          </p:spTgt>
-                                        </p:tgtEl>
-                                        <p:attrNameLst>
-                                          <p:attrName>style.visibility</p:attrName>
-                                        </p:attrNameLst>
-                                      </p:cBhvr>
-                                      <p:to>
-                                        <p:strVal val="visible"/>
-                                      </p:to>
-                                    </p:set>
-                                  </p:childTnLst>
-                                </p:cTn>
-                              </p:par>
-                            </p:childTnLst>
-                          </p:cTn>
-                        </p:par>
-                      </p:childTnLst>
-                    </p:cTn>
-                  </p:par>
                 </p:childTnLst>
               </p:cTn>
               <p:prevCondLst>
@@ -26941,13 +26817,8 @@
             <a:pPr lvl="1"/>
             <a:r>
               <a:rPr lang="en-US" sz="1800" dirty="0" smtClean="0"/>
-              <a:t>Express </a:t>
-            </a:r>
-            <a:r>
-              <a:rPr lang="en-US" sz="1800" dirty="0" smtClean="0"/>
-              <a:t>3</a:t>
-            </a:r>
-            <a:endParaRPr lang="en-US" sz="1800" dirty="0" smtClean="0"/>
+              <a:t>Express 3</a:t>
+            </a:r>
           </a:p>
           <a:p>
             <a:pPr lvl="1"/>

</xml_diff>